<commit_message>
Update Buffer Tree - Project presentation I.pptx
</commit_message>
<xml_diff>
--- a/Buffer Tree - Project presentation I.pptx
+++ b/Buffer Tree - Project presentation I.pptx
@@ -359,7 +359,7 @@
           <a:p>
             <a:fld id="{36E593F2-E5B6-46CF-A626-C53983199A88}" type="datetimeFigureOut">
               <a:rPr lang="en-US" smtClean="0"/>
-              <a:t>4/16/2020</a:t>
+              <a:t>7/2/2020</a:t>
             </a:fld>
             <a:endParaRPr lang="en-US"/>
           </a:p>
@@ -567,7 +567,7 @@
           <a:p>
             <a:fld id="{36E593F2-E5B6-46CF-A626-C53983199A88}" type="datetimeFigureOut">
               <a:rPr lang="en-US" smtClean="0"/>
-              <a:t>4/16/2020</a:t>
+              <a:t>7/2/2020</a:t>
             </a:fld>
             <a:endParaRPr lang="en-US"/>
           </a:p>
@@ -823,7 +823,7 @@
           <a:p>
             <a:fld id="{36E593F2-E5B6-46CF-A626-C53983199A88}" type="datetimeFigureOut">
               <a:rPr lang="en-US" smtClean="0"/>
-              <a:t>4/16/2020</a:t>
+              <a:t>7/2/2020</a:t>
             </a:fld>
             <a:endParaRPr lang="en-US"/>
           </a:p>
@@ -997,7 +997,7 @@
           <a:p>
             <a:fld id="{36E593F2-E5B6-46CF-A626-C53983199A88}" type="datetimeFigureOut">
               <a:rPr lang="en-US" smtClean="0"/>
-              <a:t>4/16/2020</a:t>
+              <a:t>7/2/2020</a:t>
             </a:fld>
             <a:endParaRPr lang="en-US"/>
           </a:p>
@@ -1340,7 +1340,7 @@
           <a:p>
             <a:fld id="{36E593F2-E5B6-46CF-A626-C53983199A88}" type="datetimeFigureOut">
               <a:rPr lang="en-US" smtClean="0"/>
-              <a:t>4/16/2020</a:t>
+              <a:t>7/2/2020</a:t>
             </a:fld>
             <a:endParaRPr lang="en-US"/>
           </a:p>
@@ -1615,7 +1615,7 @@
           <a:p>
             <a:fld id="{36E593F2-E5B6-46CF-A626-C53983199A88}" type="datetimeFigureOut">
               <a:rPr lang="en-US" smtClean="0"/>
-              <a:t>4/16/2020</a:t>
+              <a:t>7/2/2020</a:t>
             </a:fld>
             <a:endParaRPr lang="en-US"/>
           </a:p>
@@ -1994,7 +1994,7 @@
           <a:p>
             <a:fld id="{36E593F2-E5B6-46CF-A626-C53983199A88}" type="datetimeFigureOut">
               <a:rPr lang="en-US" smtClean="0"/>
-              <a:t>4/16/2020</a:t>
+              <a:t>7/2/2020</a:t>
             </a:fld>
             <a:endParaRPr lang="en-US"/>
           </a:p>
@@ -2112,7 +2112,7 @@
           <a:p>
             <a:fld id="{36E593F2-E5B6-46CF-A626-C53983199A88}" type="datetimeFigureOut">
               <a:rPr lang="en-US" smtClean="0"/>
-              <a:t>4/16/2020</a:t>
+              <a:t>7/2/2020</a:t>
             </a:fld>
             <a:endParaRPr lang="en-US"/>
           </a:p>
@@ -2283,7 +2283,7 @@
           <a:p>
             <a:fld id="{36E593F2-E5B6-46CF-A626-C53983199A88}" type="datetimeFigureOut">
               <a:rPr lang="en-US" smtClean="0"/>
-              <a:t>4/16/2020</a:t>
+              <a:t>7/2/2020</a:t>
             </a:fld>
             <a:endParaRPr lang="en-US"/>
           </a:p>
@@ -2637,7 +2637,7 @@
           <a:p>
             <a:fld id="{36E593F2-E5B6-46CF-A626-C53983199A88}" type="datetimeFigureOut">
               <a:rPr lang="en-US" smtClean="0"/>
-              <a:t>4/16/2020</a:t>
+              <a:t>7/2/2020</a:t>
             </a:fld>
             <a:endParaRPr lang="en-US"/>
           </a:p>
@@ -3019,7 +3019,7 @@
           <a:p>
             <a:fld id="{36E593F2-E5B6-46CF-A626-C53983199A88}" type="datetimeFigureOut">
               <a:rPr lang="en-US" smtClean="0"/>
-              <a:t>4/16/2020</a:t>
+              <a:t>7/2/2020</a:t>
             </a:fld>
             <a:endParaRPr lang="en-US"/>
           </a:p>
@@ -3306,7 +3306,7 @@
           <a:p>
             <a:fld id="{36E593F2-E5B6-46CF-A626-C53983199A88}" type="datetimeFigureOut">
               <a:rPr lang="en-US" smtClean="0"/>
-              <a:t>4/16/2020</a:t>
+              <a:t>7/2/2020</a:t>
             </a:fld>
             <a:endParaRPr lang="en-US"/>
           </a:p>
@@ -8872,13 +8872,13 @@
           <a:lstStyle/>
           <a:p>
             <a:r>
-              <a:rPr lang="en-US" sz="1000" spc="-6">
+              <a:rPr lang="en-US" sz="1000" spc="-6" dirty="0">
                 <a:solidFill>
                   <a:schemeClr val="dk2"/>
                 </a:solidFill>
                 <a:latin typeface="Calibri" panose="020F0502020204030204" pitchFamily="34" charset="0"/>
               </a:rPr>
-              <a:t>Jul 9, 2020</a:t>
+              <a:t>Jul 2, 2020</a:t>
             </a:r>
           </a:p>
         </p:txBody>

</xml_diff>